<commit_message>
Add 4th option to flowcharts
</commit_message>
<xml_diff>
--- a/results/fig1/eICU_flowchart.pptx
+++ b/results/fig1/eICU_flowchart.pptx
@@ -5,12 +5,13 @@
     <p:sldMasterId id="2147483660" r:id="rId4"/>
   </p:sldMasterIdLst>
   <p:notesMasterIdLst>
-    <p:notesMasterId r:id="rId8"/>
+    <p:notesMasterId r:id="rId9"/>
   </p:notesMasterIdLst>
   <p:sldIdLst>
     <p:sldId id="2154" r:id="rId5"/>
     <p:sldId id="2155" r:id="rId6"/>
     <p:sldId id="2156" r:id="rId7"/>
+    <p:sldId id="2157" r:id="rId8"/>
   </p:sldIdLst>
   <p:sldSz cx="12798425" cy="7199313"/>
   <p:notesSz cx="6858000" cy="9144000"/>
@@ -734,6 +735,95 @@
 </p:notes>
 </file>
 
+<file path=ppt/notesSlides/notesSlide4.xml><?xml version="1.0" encoding="utf-8"?>
+<p:notes xmlns:a="http://schemas.openxmlformats.org/drawingml/2006/main" xmlns:r="http://schemas.openxmlformats.org/officeDocument/2006/relationships" xmlns:p="http://schemas.openxmlformats.org/presentationml/2006/main">
+  <p:cSld>
+    <p:spTree>
+      <p:nvGrpSpPr>
+        <p:cNvPr id="1" name=""/>
+        <p:cNvGrpSpPr/>
+        <p:nvPr/>
+      </p:nvGrpSpPr>
+      <p:grpSpPr>
+        <a:xfrm>
+          <a:off x="0" y="0"/>
+          <a:ext cx="0" cy="0"/>
+          <a:chOff x="0" y="0"/>
+          <a:chExt cx="0" cy="0"/>
+        </a:xfrm>
+      </p:grpSpPr>
+      <p:sp>
+        <p:nvSpPr>
+          <p:cNvPr id="2" name="Folienbildplatzhalter 1"/>
+          <p:cNvSpPr>
+            <a:spLocks noGrp="1" noRot="1" noChangeAspect="1"/>
+          </p:cNvSpPr>
+          <p:nvPr>
+            <p:ph type="sldImg"/>
+          </p:nvPr>
+        </p:nvSpPr>
+        <p:spPr>
+          <a:xfrm>
+            <a:off x="687388" y="1143000"/>
+            <a:ext cx="5483225" cy="3086100"/>
+          </a:xfrm>
+        </p:spPr>
+      </p:sp>
+      <p:sp>
+        <p:nvSpPr>
+          <p:cNvPr id="3" name="Notizenplatzhalter 2"/>
+          <p:cNvSpPr>
+            <a:spLocks noGrp="1"/>
+          </p:cNvSpPr>
+          <p:nvPr>
+            <p:ph type="body" idx="1"/>
+          </p:nvPr>
+        </p:nvSpPr>
+        <p:spPr/>
+        <p:txBody>
+          <a:bodyPr/>
+          <a:lstStyle/>
+          <a:p>
+            <a:endParaRPr lang="de-DE" dirty="0"/>
+          </a:p>
+        </p:txBody>
+      </p:sp>
+      <p:sp>
+        <p:nvSpPr>
+          <p:cNvPr id="4" name="Foliennummernplatzhalter 3"/>
+          <p:cNvSpPr>
+            <a:spLocks noGrp="1"/>
+          </p:cNvSpPr>
+          <p:nvPr>
+            <p:ph type="sldNum" sz="quarter" idx="5"/>
+          </p:nvPr>
+        </p:nvSpPr>
+        <p:spPr/>
+        <p:txBody>
+          <a:bodyPr/>
+          <a:lstStyle/>
+          <a:p>
+            <a:fld id="{5C3705C8-8D8D-C141-93E1-E1EAB03375A0}" type="slidenum">
+              <a:rPr lang="de-CH" smtClean="0"/>
+              <a:t>4</a:t>
+            </a:fld>
+            <a:endParaRPr lang="de-CH"/>
+          </a:p>
+        </p:txBody>
+      </p:sp>
+    </p:spTree>
+    <p:extLst>
+      <p:ext uri="{BB962C8B-B14F-4D97-AF65-F5344CB8AC3E}">
+        <p14:creationId xmlns:p14="http://schemas.microsoft.com/office/powerpoint/2010/main" val="2653925206"/>
+      </p:ext>
+    </p:extLst>
+  </p:cSld>
+  <p:clrMapOvr>
+    <a:masterClrMapping/>
+  </p:clrMapOvr>
+</p:notes>
+</file>
+
 <file path=ppt/slideLayouts/slideLayout1.xml><?xml version="1.0" encoding="utf-8"?>
 <p:sldLayout xmlns:a="http://schemas.openxmlformats.org/drawingml/2006/main" xmlns:r="http://schemas.openxmlformats.org/officeDocument/2006/relationships" xmlns:p="http://schemas.openxmlformats.org/presentationml/2006/main" type="title" preserve="1">
   <p:cSld name="Titelfolie">
@@ -4597,7 +4687,7 @@
               </a14:hiddenLine>
             </a:ext>
             <a:ext uri="{FAA26D3D-D897-4be2-8F04-BA451C77F1D7}">
-              <ma14:placeholderFlag xmlns="" xmlns:ma14="http://schemas.microsoft.com/office/mac/drawingml/2011/main" val="1"/>
+              <ma14:placeholderFlag xmlns:ma14="http://schemas.microsoft.com/office/mac/drawingml/2011/main" xmlns="" val="1"/>
             </a:ext>
           </a:extLst>
         </p:spPr>
@@ -4653,7 +4743,7 @@
               </a14:hiddenLine>
             </a:ext>
             <a:ext uri="{FAA26D3D-D897-4be2-8F04-BA451C77F1D7}">
-              <ma14:placeholderFlag xmlns="" xmlns:ma14="http://schemas.microsoft.com/office/mac/drawingml/2011/main" val="1"/>
+              <ma14:placeholderFlag xmlns:ma14="http://schemas.microsoft.com/office/mac/drawingml/2011/main" xmlns="" val="1"/>
             </a:ext>
           </a:extLst>
         </p:spPr>
@@ -5761,8 +5851,12 @@
           </a:lstStyle>
           <a:p>
             <a:r>
+              <a:rPr lang="en-US" b="1" dirty="0"/>
+              <a:t>3,963</a:t>
+            </a:r>
+            <a:r>
               <a:rPr lang="en-US" dirty="0"/>
-              <a:t>3,963 adult septic</a:t>
+              <a:t> adult septic</a:t>
             </a:r>
             <a:br>
               <a:rPr lang="en-US" dirty="0"/>
@@ -6498,8 +6592,12 @@
           </a:lstStyle>
           <a:p>
             <a:r>
+              <a:rPr lang="en-US" b="1" dirty="0"/>
+              <a:t>6,021</a:t>
+            </a:r>
+            <a:r>
               <a:rPr lang="en-US" dirty="0"/>
-              <a:t>6,021 adult septic</a:t>
+              <a:t> adult septic</a:t>
             </a:r>
             <a:br>
               <a:rPr lang="en-US" dirty="0"/>
@@ -7235,8 +7333,12 @@
           </a:lstStyle>
           <a:p>
             <a:r>
+              <a:rPr lang="en-US" b="1" dirty="0"/>
+              <a:t>5,521</a:t>
+            </a:r>
+            <a:r>
               <a:rPr lang="en-US" dirty="0"/>
-              <a:t>5,521 adult septic</a:t>
+              <a:t> adult septic</a:t>
             </a:r>
             <a:br>
               <a:rPr lang="en-US" dirty="0"/>
@@ -7335,6 +7437,1079 @@
     <p:extLst>
       <p:ext uri="{BB962C8B-B14F-4D97-AF65-F5344CB8AC3E}">
         <p14:creationId xmlns:p14="http://schemas.microsoft.com/office/powerpoint/2010/main" val="3039464093"/>
+      </p:ext>
+    </p:extLst>
+  </p:cSld>
+  <p:clrMapOvr>
+    <a:masterClrMapping/>
+  </p:clrMapOvr>
+</p:sld>
+</file>
+
+<file path=ppt/slides/slide4.xml><?xml version="1.0" encoding="utf-8"?>
+<p:sld xmlns:a="http://schemas.openxmlformats.org/drawingml/2006/main" xmlns:r="http://schemas.openxmlformats.org/officeDocument/2006/relationships" xmlns:p="http://schemas.openxmlformats.org/presentationml/2006/main">
+  <p:cSld>
+    <p:spTree>
+      <p:nvGrpSpPr>
+        <p:cNvPr id="1" name=""/>
+        <p:cNvGrpSpPr/>
+        <p:nvPr/>
+      </p:nvGrpSpPr>
+      <p:grpSpPr>
+        <a:xfrm>
+          <a:off x="0" y="0"/>
+          <a:ext cx="0" cy="0"/>
+          <a:chOff x="0" y="0"/>
+          <a:chExt cx="0" cy="0"/>
+        </a:xfrm>
+      </p:grpSpPr>
+      <p:sp>
+        <p:nvSpPr>
+          <p:cNvPr id="26" name="Textfeld 7">
+            <a:extLst>
+              <a:ext uri="{FF2B5EF4-FFF2-40B4-BE49-F238E27FC236}">
+                <a16:creationId xmlns:a16="http://schemas.microsoft.com/office/drawing/2014/main" id="{CA41E3C6-77E3-A9BA-388B-932070386B55}"/>
+              </a:ext>
+            </a:extLst>
+          </p:cNvPr>
+          <p:cNvSpPr txBox="1"/>
+          <p:nvPr/>
+        </p:nvSpPr>
+        <p:spPr>
+          <a:xfrm>
+            <a:off x="4396207" y="635295"/>
+            <a:ext cx="1723297" cy="492067"/>
+          </a:xfrm>
+          <a:prstGeom prst="rect">
+            <a:avLst/>
+          </a:prstGeom>
+          <a:noFill/>
+          <a:ln>
+            <a:solidFill>
+              <a:schemeClr val="tx1"/>
+            </a:solidFill>
+          </a:ln>
+        </p:spPr>
+        <p:txBody>
+          <a:bodyPr wrap="square" rtlCol="0" anchor="ctr" anchorCtr="0">
+            <a:noAutofit/>
+          </a:bodyPr>
+          <a:lstStyle/>
+          <a:p>
+            <a:pPr algn="ctr"/>
+            <a:r>
+              <a:rPr lang="en-US" sz="1200" dirty="0">
+                <a:latin typeface="Arial" panose="020B0604020202020204" pitchFamily="34" charset="0"/>
+                <a:cs typeface="Arial" panose="020B0604020202020204" pitchFamily="34" charset="0"/>
+              </a:rPr>
+              <a:t>200,859 ICU stays </a:t>
+            </a:r>
+          </a:p>
+          <a:p>
+            <a:pPr algn="ctr"/>
+            <a:r>
+              <a:rPr lang="en-US" sz="1200" dirty="0">
+                <a:latin typeface="Arial" panose="020B0604020202020204" pitchFamily="34" charset="0"/>
+                <a:cs typeface="Arial" panose="020B0604020202020204" pitchFamily="34" charset="0"/>
+              </a:rPr>
+              <a:t>in eICU-CRD</a:t>
+            </a:r>
+          </a:p>
+        </p:txBody>
+      </p:sp>
+      <p:sp>
+        <p:nvSpPr>
+          <p:cNvPr id="27" name="Textfeld 10">
+            <a:extLst>
+              <a:ext uri="{FF2B5EF4-FFF2-40B4-BE49-F238E27FC236}">
+                <a16:creationId xmlns:a16="http://schemas.microsoft.com/office/drawing/2014/main" id="{6CBAAC22-E24B-258F-6B8B-A77680B1792A}"/>
+              </a:ext>
+            </a:extLst>
+          </p:cNvPr>
+          <p:cNvSpPr txBox="1"/>
+          <p:nvPr/>
+        </p:nvSpPr>
+        <p:spPr>
+          <a:xfrm>
+            <a:off x="1256115" y="1206571"/>
+            <a:ext cx="2736000" cy="276999"/>
+          </a:xfrm>
+          <a:prstGeom prst="rect">
+            <a:avLst/>
+          </a:prstGeom>
+          <a:noFill/>
+          <a:ln>
+            <a:solidFill>
+              <a:schemeClr val="tx1"/>
+            </a:solidFill>
+          </a:ln>
+        </p:spPr>
+        <p:txBody>
+          <a:bodyPr wrap="square" rtlCol="0" anchor="ctr" anchorCtr="0">
+            <a:spAutoFit/>
+          </a:bodyPr>
+          <a:lstStyle/>
+          <a:p>
+            <a:r>
+              <a:rPr lang="en-US" sz="1200" dirty="0">
+                <a:latin typeface="Arial" panose="020B0604020202020204" pitchFamily="34" charset="0"/>
+                <a:cs typeface="Arial" panose="020B0604020202020204" pitchFamily="34" charset="0"/>
+              </a:rPr>
+              <a:t>Not Sepsis-3 Stays (n=152,072)</a:t>
+            </a:r>
+          </a:p>
+        </p:txBody>
+      </p:sp>
+      <p:cxnSp>
+        <p:nvCxnSpPr>
+          <p:cNvPr id="28" name="Gerade Verbindung mit Pfeil 12">
+            <a:extLst>
+              <a:ext uri="{FF2B5EF4-FFF2-40B4-BE49-F238E27FC236}">
+                <a16:creationId xmlns:a16="http://schemas.microsoft.com/office/drawing/2014/main" id="{D03B28A3-5EFC-6874-EAE7-831A3076466E}"/>
+              </a:ext>
+            </a:extLst>
+          </p:cNvPr>
+          <p:cNvCxnSpPr>
+            <a:cxnSpLocks/>
+            <a:endCxn id="27" idx="3"/>
+          </p:cNvCxnSpPr>
+          <p:nvPr/>
+        </p:nvCxnSpPr>
+        <p:spPr>
+          <a:xfrm flipH="1">
+            <a:off x="3992115" y="1345071"/>
+            <a:ext cx="1260000" cy="0"/>
+          </a:xfrm>
+          <a:prstGeom prst="straightConnector1">
+            <a:avLst/>
+          </a:prstGeom>
+          <a:ln>
+            <a:tailEnd type="triangle"/>
+          </a:ln>
+        </p:spPr>
+        <p:style>
+          <a:lnRef idx="1">
+            <a:schemeClr val="dk1"/>
+          </a:lnRef>
+          <a:fillRef idx="0">
+            <a:schemeClr val="dk1"/>
+          </a:fillRef>
+          <a:effectRef idx="0">
+            <a:schemeClr val="dk1"/>
+          </a:effectRef>
+          <a:fontRef idx="minor">
+            <a:schemeClr val="tx1"/>
+          </a:fontRef>
+        </p:style>
+      </p:cxnSp>
+      <p:cxnSp>
+        <p:nvCxnSpPr>
+          <p:cNvPr id="29" name="Gerade Verbindung mit Pfeil 11">
+            <a:extLst>
+              <a:ext uri="{FF2B5EF4-FFF2-40B4-BE49-F238E27FC236}">
+                <a16:creationId xmlns:a16="http://schemas.microsoft.com/office/drawing/2014/main" id="{77B3571F-2A91-06EC-EE2B-D74E80E4D91F}"/>
+              </a:ext>
+            </a:extLst>
+          </p:cNvPr>
+          <p:cNvCxnSpPr>
+            <a:cxnSpLocks/>
+            <a:stCxn id="26" idx="2"/>
+            <a:endCxn id="31" idx="0"/>
+          </p:cNvCxnSpPr>
+          <p:nvPr/>
+        </p:nvCxnSpPr>
+        <p:spPr>
+          <a:xfrm>
+            <a:off x="5257856" y="1127362"/>
+            <a:ext cx="0" cy="562211"/>
+          </a:xfrm>
+          <a:prstGeom prst="straightConnector1">
+            <a:avLst/>
+          </a:prstGeom>
+          <a:ln>
+            <a:tailEnd type="triangle"/>
+          </a:ln>
+        </p:spPr>
+        <p:style>
+          <a:lnRef idx="1">
+            <a:schemeClr val="dk1"/>
+          </a:lnRef>
+          <a:fillRef idx="0">
+            <a:schemeClr val="dk1"/>
+          </a:fillRef>
+          <a:effectRef idx="0">
+            <a:schemeClr val="dk1"/>
+          </a:effectRef>
+          <a:fontRef idx="minor">
+            <a:schemeClr val="tx1"/>
+          </a:fontRef>
+        </p:style>
+      </p:cxnSp>
+      <p:sp>
+        <p:nvSpPr>
+          <p:cNvPr id="30" name="Textfeld 8">
+            <a:extLst>
+              <a:ext uri="{FF2B5EF4-FFF2-40B4-BE49-F238E27FC236}">
+                <a16:creationId xmlns:a16="http://schemas.microsoft.com/office/drawing/2014/main" id="{7565760B-7B67-C7E1-619E-0D6E5DEAA7E5}"/>
+              </a:ext>
+            </a:extLst>
+          </p:cNvPr>
+          <p:cNvSpPr txBox="1"/>
+          <p:nvPr/>
+        </p:nvSpPr>
+        <p:spPr>
+          <a:xfrm>
+            <a:off x="101371" y="6806198"/>
+            <a:ext cx="1561716" cy="276999"/>
+          </a:xfrm>
+          <a:prstGeom prst="rect">
+            <a:avLst/>
+          </a:prstGeom>
+          <a:noFill/>
+          <a:ln>
+            <a:solidFill>
+              <a:schemeClr val="tx1"/>
+            </a:solidFill>
+          </a:ln>
+        </p:spPr>
+        <p:txBody>
+          <a:bodyPr wrap="square" rtlCol="0" anchor="ctr" anchorCtr="0">
+            <a:spAutoFit/>
+          </a:bodyPr>
+          <a:lstStyle/>
+          <a:p>
+            <a:pPr algn="ctr"/>
+            <a:r>
+              <a:rPr lang="en-US" sz="1200" dirty="0">
+                <a:latin typeface="Arial" panose="020B0604020202020204" pitchFamily="34" charset="0"/>
+                <a:cs typeface="Arial" panose="020B0604020202020204" pitchFamily="34" charset="0"/>
+              </a:rPr>
+              <a:t>Option 4</a:t>
+            </a:r>
+          </a:p>
+        </p:txBody>
+      </p:sp>
+      <p:sp>
+        <p:nvSpPr>
+          <p:cNvPr id="31" name="Textfeld 7">
+            <a:extLst>
+              <a:ext uri="{FF2B5EF4-FFF2-40B4-BE49-F238E27FC236}">
+                <a16:creationId xmlns:a16="http://schemas.microsoft.com/office/drawing/2014/main" id="{34765ADA-E96E-A17D-B35C-A820BA315A2E}"/>
+              </a:ext>
+            </a:extLst>
+          </p:cNvPr>
+          <p:cNvSpPr txBox="1"/>
+          <p:nvPr/>
+        </p:nvSpPr>
+        <p:spPr>
+          <a:xfrm>
+            <a:off x="4396207" y="1689573"/>
+            <a:ext cx="1723297" cy="644709"/>
+          </a:xfrm>
+          <a:prstGeom prst="rect">
+            <a:avLst/>
+          </a:prstGeom>
+          <a:noFill/>
+          <a:ln>
+            <a:solidFill>
+              <a:schemeClr val="tx1"/>
+            </a:solidFill>
+          </a:ln>
+        </p:spPr>
+        <p:txBody>
+          <a:bodyPr wrap="square" rtlCol="0" anchor="ctr" anchorCtr="0">
+            <a:noAutofit/>
+          </a:bodyPr>
+          <a:lstStyle>
+            <a:defPPr>
+              <a:defRPr lang="de-DE"/>
+            </a:defPPr>
+            <a:lvl1pPr algn="ctr">
+              <a:defRPr sz="1200">
+                <a:latin typeface="Arial" panose="020B0604020202020204" pitchFamily="34" charset="0"/>
+                <a:cs typeface="Arial" panose="020B0604020202020204" pitchFamily="34" charset="0"/>
+              </a:defRPr>
+            </a:lvl1pPr>
+          </a:lstStyle>
+          <a:p>
+            <a:r>
+              <a:rPr lang="en-US" dirty="0"/>
+              <a:t>48,780 septic ICU stays in eICU-CRD</a:t>
+            </a:r>
+          </a:p>
+        </p:txBody>
+      </p:sp>
+      <p:sp>
+        <p:nvSpPr>
+          <p:cNvPr id="9" name="Textfeld 10">
+            <a:extLst>
+              <a:ext uri="{FF2B5EF4-FFF2-40B4-BE49-F238E27FC236}">
+                <a16:creationId xmlns:a16="http://schemas.microsoft.com/office/drawing/2014/main" id="{598AA1A6-B27B-91CF-1B79-F0FF1C744259}"/>
+              </a:ext>
+            </a:extLst>
+          </p:cNvPr>
+          <p:cNvSpPr txBox="1"/>
+          <p:nvPr/>
+        </p:nvSpPr>
+        <p:spPr>
+          <a:xfrm>
+            <a:off x="1256115" y="3483848"/>
+            <a:ext cx="2736000" cy="830997"/>
+          </a:xfrm>
+          <a:prstGeom prst="rect">
+            <a:avLst/>
+          </a:prstGeom>
+          <a:noFill/>
+          <a:ln>
+            <a:solidFill>
+              <a:schemeClr val="tx1"/>
+            </a:solidFill>
+          </a:ln>
+        </p:spPr>
+        <p:txBody>
+          <a:bodyPr wrap="square" rtlCol="0" anchor="ctr" anchorCtr="0">
+            <a:spAutoFit/>
+          </a:bodyPr>
+          <a:lstStyle/>
+          <a:p>
+            <a:r>
+              <a:rPr lang="en-US" sz="1200" dirty="0">
+                <a:latin typeface="Arial" panose="020B0604020202020204" pitchFamily="34" charset="0"/>
+                <a:cs typeface="Arial" panose="020B0604020202020204" pitchFamily="34" charset="0"/>
+              </a:rPr>
+              <a:t>Stay Exclusion Criteria:</a:t>
+            </a:r>
+          </a:p>
+          <a:p>
+            <a:pPr marL="171450" indent="-171450">
+              <a:buFont typeface="Arial" panose="020B0604020202020204" pitchFamily="34" charset="0"/>
+              <a:buChar char="•"/>
+            </a:pPr>
+            <a:r>
+              <a:rPr lang="en-US" sz="1200" dirty="0">
+                <a:latin typeface="Arial" panose="020B0604020202020204" pitchFamily="34" charset="0"/>
+                <a:cs typeface="Arial" panose="020B0604020202020204" pitchFamily="34" charset="0"/>
+              </a:rPr>
+              <a:t>LoS &lt; 24 hours (n=1618)</a:t>
+            </a:r>
+          </a:p>
+          <a:p>
+            <a:pPr marL="171450" indent="-171450">
+              <a:buFont typeface="Arial" panose="020B0604020202020204" pitchFamily="34" charset="0"/>
+              <a:buChar char="•"/>
+            </a:pPr>
+            <a:r>
+              <a:rPr lang="en-US" sz="1200" dirty="0">
+                <a:latin typeface="Arial" panose="020B0604020202020204" pitchFamily="34" charset="0"/>
+                <a:cs typeface="Arial" panose="020B0604020202020204" pitchFamily="34" charset="0"/>
+              </a:rPr>
+              <a:t>Age &lt; 18 years (n=13)</a:t>
+            </a:r>
+          </a:p>
+          <a:p>
+            <a:pPr marL="171450" indent="-171450">
+              <a:buFont typeface="Arial" panose="020B0604020202020204" pitchFamily="34" charset="0"/>
+              <a:buChar char="•"/>
+            </a:pPr>
+            <a:r>
+              <a:rPr lang="en-US" sz="1200" dirty="0">
+                <a:latin typeface="Arial" panose="020B0604020202020204" pitchFamily="34" charset="0"/>
+                <a:cs typeface="Arial" panose="020B0604020202020204" pitchFamily="34" charset="0"/>
+              </a:rPr>
+              <a:t>Recurrent stays (n=904)</a:t>
+            </a:r>
+          </a:p>
+        </p:txBody>
+      </p:sp>
+      <p:sp>
+        <p:nvSpPr>
+          <p:cNvPr id="36" name="Textfeld 7">
+            <a:extLst>
+              <a:ext uri="{FF2B5EF4-FFF2-40B4-BE49-F238E27FC236}">
+                <a16:creationId xmlns:a16="http://schemas.microsoft.com/office/drawing/2014/main" id="{A1271EE3-ADCA-D508-3E25-0F2F89E4F0F6}"/>
+              </a:ext>
+            </a:extLst>
+          </p:cNvPr>
+          <p:cNvSpPr txBox="1"/>
+          <p:nvPr/>
+        </p:nvSpPr>
+        <p:spPr>
+          <a:xfrm>
+            <a:off x="4396207" y="2916602"/>
+            <a:ext cx="1723297" cy="644709"/>
+          </a:xfrm>
+          <a:prstGeom prst="rect">
+            <a:avLst/>
+          </a:prstGeom>
+          <a:noFill/>
+          <a:ln>
+            <a:solidFill>
+              <a:schemeClr val="tx1"/>
+            </a:solidFill>
+          </a:ln>
+        </p:spPr>
+        <p:txBody>
+          <a:bodyPr wrap="square" rtlCol="0" anchor="ctr" anchorCtr="0">
+            <a:noAutofit/>
+          </a:bodyPr>
+          <a:lstStyle>
+            <a:defPPr>
+              <a:defRPr lang="de-DE"/>
+            </a:defPPr>
+            <a:lvl1pPr algn="ctr">
+              <a:defRPr sz="1200">
+                <a:latin typeface="Arial" panose="020B0604020202020204" pitchFamily="34" charset="0"/>
+                <a:cs typeface="Arial" panose="020B0604020202020204" pitchFamily="34" charset="0"/>
+              </a:defRPr>
+            </a:lvl1pPr>
+          </a:lstStyle>
+          <a:p>
+            <a:r>
+              <a:rPr lang="en-US" dirty="0"/>
+              <a:t>5,614 septic ICU</a:t>
+            </a:r>
+            <a:br>
+              <a:rPr lang="en-US" dirty="0"/>
+            </a:br>
+            <a:r>
+              <a:rPr lang="en-US" dirty="0"/>
+              <a:t>stays with lactate 1</a:t>
+            </a:r>
+            <a:br>
+              <a:rPr lang="en-US" dirty="0"/>
+            </a:br>
+            <a:r>
+              <a:rPr lang="en-US" dirty="0"/>
+              <a:t>values in eICU-CRD</a:t>
+            </a:r>
+          </a:p>
+        </p:txBody>
+      </p:sp>
+      <p:cxnSp>
+        <p:nvCxnSpPr>
+          <p:cNvPr id="38" name="Straight Arrow Connector 37">
+            <a:extLst>
+              <a:ext uri="{FF2B5EF4-FFF2-40B4-BE49-F238E27FC236}">
+                <a16:creationId xmlns:a16="http://schemas.microsoft.com/office/drawing/2014/main" id="{F1B47FAF-9E03-4627-2C76-88D9C4567AE7}"/>
+              </a:ext>
+            </a:extLst>
+          </p:cNvPr>
+          <p:cNvCxnSpPr>
+            <a:stCxn id="31" idx="2"/>
+            <a:endCxn id="36" idx="0"/>
+          </p:cNvCxnSpPr>
+          <p:nvPr/>
+        </p:nvCxnSpPr>
+        <p:spPr bwMode="auto">
+          <a:xfrm>
+            <a:off x="5257856" y="2334282"/>
+            <a:ext cx="0" cy="582320"/>
+          </a:xfrm>
+          <a:prstGeom prst="straightConnector1">
+            <a:avLst/>
+          </a:prstGeom>
+          <a:solidFill>
+            <a:schemeClr val="accent1"/>
+          </a:solidFill>
+          <a:ln w="9525" cap="flat" cmpd="sng" algn="ctr">
+            <a:solidFill>
+              <a:schemeClr val="tx1"/>
+            </a:solidFill>
+            <a:prstDash val="solid"/>
+            <a:round/>
+            <a:headEnd type="none" w="med" len="med"/>
+            <a:tailEnd type="triangle"/>
+          </a:ln>
+          <a:effectLst/>
+        </p:spPr>
+      </p:cxnSp>
+      <p:sp>
+        <p:nvSpPr>
+          <p:cNvPr id="39" name="Textfeld 10">
+            <a:extLst>
+              <a:ext uri="{FF2B5EF4-FFF2-40B4-BE49-F238E27FC236}">
+                <a16:creationId xmlns:a16="http://schemas.microsoft.com/office/drawing/2014/main" id="{98F131CA-82E4-8AC0-CC20-89C7DBB29D9D}"/>
+              </a:ext>
+            </a:extLst>
+          </p:cNvPr>
+          <p:cNvSpPr txBox="1"/>
+          <p:nvPr/>
+        </p:nvSpPr>
+        <p:spPr>
+          <a:xfrm>
+            <a:off x="1259698" y="2562140"/>
+            <a:ext cx="2736000" cy="276999"/>
+          </a:xfrm>
+          <a:prstGeom prst="rect">
+            <a:avLst/>
+          </a:prstGeom>
+          <a:noFill/>
+          <a:ln>
+            <a:solidFill>
+              <a:schemeClr val="tx1"/>
+            </a:solidFill>
+          </a:ln>
+        </p:spPr>
+        <p:txBody>
+          <a:bodyPr wrap="square" rtlCol="0" anchor="ctr" anchorCtr="0">
+            <a:spAutoFit/>
+          </a:bodyPr>
+          <a:lstStyle/>
+          <a:p>
+            <a:r>
+              <a:rPr lang="en-US" sz="1200" dirty="0">
+                <a:latin typeface="Arial" panose="020B0604020202020204" pitchFamily="34" charset="0"/>
+                <a:cs typeface="Arial" panose="020B0604020202020204" pitchFamily="34" charset="0"/>
+              </a:rPr>
+              <a:t>Day 1 Lactate Missing (n=18,531)</a:t>
+            </a:r>
+          </a:p>
+        </p:txBody>
+      </p:sp>
+      <p:cxnSp>
+        <p:nvCxnSpPr>
+          <p:cNvPr id="42" name="Straight Arrow Connector 41">
+            <a:extLst>
+              <a:ext uri="{FF2B5EF4-FFF2-40B4-BE49-F238E27FC236}">
+                <a16:creationId xmlns:a16="http://schemas.microsoft.com/office/drawing/2014/main" id="{F223B246-5545-9CA7-042B-26F7A83249E6}"/>
+              </a:ext>
+            </a:extLst>
+          </p:cNvPr>
+          <p:cNvCxnSpPr>
+            <a:cxnSpLocks/>
+            <a:endCxn id="39" idx="3"/>
+          </p:cNvCxnSpPr>
+          <p:nvPr/>
+        </p:nvCxnSpPr>
+        <p:spPr bwMode="auto">
+          <a:xfrm flipH="1">
+            <a:off x="3995698" y="2700639"/>
+            <a:ext cx="1262158" cy="1"/>
+          </a:xfrm>
+          <a:prstGeom prst="straightConnector1">
+            <a:avLst/>
+          </a:prstGeom>
+          <a:solidFill>
+            <a:schemeClr val="accent1"/>
+          </a:solidFill>
+          <a:ln w="9525" cap="flat" cmpd="sng" algn="ctr">
+            <a:solidFill>
+              <a:schemeClr val="tx1"/>
+            </a:solidFill>
+            <a:prstDash val="solid"/>
+            <a:round/>
+            <a:headEnd type="none" w="med" len="med"/>
+            <a:tailEnd type="triangle"/>
+          </a:ln>
+          <a:effectLst/>
+        </p:spPr>
+      </p:cxnSp>
+      <p:sp>
+        <p:nvSpPr>
+          <p:cNvPr id="45" name="Textfeld 7">
+            <a:extLst>
+              <a:ext uri="{FF2B5EF4-FFF2-40B4-BE49-F238E27FC236}">
+                <a16:creationId xmlns:a16="http://schemas.microsoft.com/office/drawing/2014/main" id="{3CDB5386-C388-15A6-8278-0333E2EFE7BB}"/>
+              </a:ext>
+            </a:extLst>
+          </p:cNvPr>
+          <p:cNvSpPr txBox="1"/>
+          <p:nvPr/>
+        </p:nvSpPr>
+        <p:spPr>
+          <a:xfrm>
+            <a:off x="4396207" y="5779622"/>
+            <a:ext cx="1723297" cy="644709"/>
+          </a:xfrm>
+          <a:prstGeom prst="rect">
+            <a:avLst/>
+          </a:prstGeom>
+          <a:noFill/>
+          <a:ln>
+            <a:solidFill>
+              <a:schemeClr val="tx1"/>
+            </a:solidFill>
+          </a:ln>
+        </p:spPr>
+        <p:txBody>
+          <a:bodyPr wrap="square" rtlCol="0" anchor="ctr" anchorCtr="0">
+            <a:noAutofit/>
+          </a:bodyPr>
+          <a:lstStyle>
+            <a:defPPr>
+              <a:defRPr lang="de-DE"/>
+            </a:defPPr>
+            <a:lvl1pPr algn="ctr">
+              <a:defRPr sz="1200">
+                <a:latin typeface="Arial" panose="020B0604020202020204" pitchFamily="34" charset="0"/>
+                <a:cs typeface="Arial" panose="020B0604020202020204" pitchFamily="34" charset="0"/>
+              </a:defRPr>
+            </a:lvl1pPr>
+          </a:lstStyle>
+          <a:p>
+            <a:r>
+              <a:rPr lang="en-US" b="1" dirty="0"/>
+              <a:t>5,873</a:t>
+            </a:r>
+            <a:r>
+              <a:rPr lang="en-US" dirty="0"/>
+              <a:t> adult septic</a:t>
+            </a:r>
+            <a:br>
+              <a:rPr lang="en-US" dirty="0"/>
+            </a:br>
+            <a:r>
+              <a:rPr lang="en-US" dirty="0"/>
+              <a:t>pats. with lactate 1&amp;2</a:t>
+            </a:r>
+            <a:br>
+              <a:rPr lang="en-US" dirty="0"/>
+            </a:br>
+            <a:r>
+              <a:rPr lang="en-US" dirty="0"/>
+              <a:t>values in eICU-CRD</a:t>
+            </a:r>
+          </a:p>
+        </p:txBody>
+      </p:sp>
+      <p:cxnSp>
+        <p:nvCxnSpPr>
+          <p:cNvPr id="49" name="Straight Arrow Connector 48">
+            <a:extLst>
+              <a:ext uri="{FF2B5EF4-FFF2-40B4-BE49-F238E27FC236}">
+                <a16:creationId xmlns:a16="http://schemas.microsoft.com/office/drawing/2014/main" id="{D760F04E-81FF-2BB1-7BB5-961D1B5A2D32}"/>
+              </a:ext>
+            </a:extLst>
+          </p:cNvPr>
+          <p:cNvCxnSpPr>
+            <a:cxnSpLocks/>
+            <a:endCxn id="9" idx="3"/>
+          </p:cNvCxnSpPr>
+          <p:nvPr/>
+        </p:nvCxnSpPr>
+        <p:spPr bwMode="auto">
+          <a:xfrm flipH="1">
+            <a:off x="3992115" y="3899346"/>
+            <a:ext cx="1269699" cy="1"/>
+          </a:xfrm>
+          <a:prstGeom prst="straightConnector1">
+            <a:avLst/>
+          </a:prstGeom>
+          <a:solidFill>
+            <a:schemeClr val="accent1"/>
+          </a:solidFill>
+          <a:ln w="9525" cap="flat" cmpd="sng" algn="ctr">
+            <a:solidFill>
+              <a:schemeClr val="tx1"/>
+            </a:solidFill>
+            <a:prstDash val="solid"/>
+            <a:round/>
+            <a:headEnd type="none" w="med" len="med"/>
+            <a:tailEnd type="triangle"/>
+          </a:ln>
+          <a:effectLst/>
+        </p:spPr>
+      </p:cxnSp>
+      <p:sp>
+        <p:nvSpPr>
+          <p:cNvPr id="3" name="Textfeld 7">
+            <a:extLst>
+              <a:ext uri="{FF2B5EF4-FFF2-40B4-BE49-F238E27FC236}">
+                <a16:creationId xmlns:a16="http://schemas.microsoft.com/office/drawing/2014/main" id="{BFD17D97-DB1D-F584-7E11-C18A8EC746A2}"/>
+              </a:ext>
+            </a:extLst>
+          </p:cNvPr>
+          <p:cNvSpPr txBox="1"/>
+          <p:nvPr/>
+        </p:nvSpPr>
+        <p:spPr>
+          <a:xfrm>
+            <a:off x="4396207" y="4184843"/>
+            <a:ext cx="1723297" cy="644709"/>
+          </a:xfrm>
+          <a:prstGeom prst="rect">
+            <a:avLst/>
+          </a:prstGeom>
+          <a:noFill/>
+          <a:ln>
+            <a:solidFill>
+              <a:schemeClr val="tx1"/>
+            </a:solidFill>
+          </a:ln>
+        </p:spPr>
+        <p:txBody>
+          <a:bodyPr wrap="square" rtlCol="0" anchor="ctr" anchorCtr="0">
+            <a:noAutofit/>
+          </a:bodyPr>
+          <a:lstStyle>
+            <a:defPPr>
+              <a:defRPr lang="de-DE"/>
+            </a:defPPr>
+            <a:lvl1pPr algn="ctr">
+              <a:defRPr sz="1200">
+                <a:latin typeface="Arial" panose="020B0604020202020204" pitchFamily="34" charset="0"/>
+                <a:cs typeface="Arial" panose="020B0604020202020204" pitchFamily="34" charset="0"/>
+              </a:defRPr>
+            </a:lvl1pPr>
+          </a:lstStyle>
+          <a:p>
+            <a:r>
+              <a:rPr lang="en-US" b="1" dirty="0"/>
+              <a:t>27,724</a:t>
+            </a:r>
+            <a:r>
+              <a:rPr lang="en-US" dirty="0"/>
+              <a:t> adult septic</a:t>
+            </a:r>
+            <a:br>
+              <a:rPr lang="en-US" dirty="0"/>
+            </a:br>
+            <a:r>
+              <a:rPr lang="en-US" dirty="0"/>
+              <a:t>patients with lactate 1</a:t>
+            </a:r>
+            <a:br>
+              <a:rPr lang="en-US" dirty="0"/>
+            </a:br>
+            <a:r>
+              <a:rPr lang="en-US" dirty="0"/>
+              <a:t>values in eICU-CRD</a:t>
+            </a:r>
+          </a:p>
+        </p:txBody>
+      </p:sp>
+      <p:cxnSp>
+        <p:nvCxnSpPr>
+          <p:cNvPr id="5" name="Straight Arrow Connector 4">
+            <a:extLst>
+              <a:ext uri="{FF2B5EF4-FFF2-40B4-BE49-F238E27FC236}">
+                <a16:creationId xmlns:a16="http://schemas.microsoft.com/office/drawing/2014/main" id="{A4F110D5-B71D-DDC5-DECD-D605B2F658C7}"/>
+              </a:ext>
+            </a:extLst>
+          </p:cNvPr>
+          <p:cNvCxnSpPr>
+            <a:stCxn id="36" idx="2"/>
+            <a:endCxn id="3" idx="0"/>
+          </p:cNvCxnSpPr>
+          <p:nvPr/>
+        </p:nvCxnSpPr>
+        <p:spPr bwMode="auto">
+          <a:xfrm>
+            <a:off x="5257856" y="3561311"/>
+            <a:ext cx="0" cy="623532"/>
+          </a:xfrm>
+          <a:prstGeom prst="straightConnector1">
+            <a:avLst/>
+          </a:prstGeom>
+          <a:solidFill>
+            <a:schemeClr val="accent1"/>
+          </a:solidFill>
+          <a:ln w="9525" cap="flat" cmpd="sng" algn="ctr">
+            <a:solidFill>
+              <a:schemeClr val="tx1"/>
+            </a:solidFill>
+            <a:prstDash val="solid"/>
+            <a:round/>
+            <a:headEnd type="none" w="med" len="med"/>
+            <a:tailEnd type="triangle"/>
+          </a:ln>
+          <a:effectLst/>
+        </p:spPr>
+      </p:cxnSp>
+      <p:cxnSp>
+        <p:nvCxnSpPr>
+          <p:cNvPr id="7" name="Straight Arrow Connector 6">
+            <a:extLst>
+              <a:ext uri="{FF2B5EF4-FFF2-40B4-BE49-F238E27FC236}">
+                <a16:creationId xmlns:a16="http://schemas.microsoft.com/office/drawing/2014/main" id="{F6D7DBF4-B197-6A50-EA37-A2E2CFF8BFDE}"/>
+              </a:ext>
+            </a:extLst>
+          </p:cNvPr>
+          <p:cNvCxnSpPr>
+            <a:cxnSpLocks/>
+            <a:stCxn id="3" idx="2"/>
+            <a:endCxn id="45" idx="0"/>
+          </p:cNvCxnSpPr>
+          <p:nvPr/>
+        </p:nvCxnSpPr>
+        <p:spPr bwMode="auto">
+          <a:xfrm>
+            <a:off x="5257856" y="4829552"/>
+            <a:ext cx="0" cy="950070"/>
+          </a:xfrm>
+          <a:prstGeom prst="straightConnector1">
+            <a:avLst/>
+          </a:prstGeom>
+          <a:solidFill>
+            <a:schemeClr val="accent1"/>
+          </a:solidFill>
+          <a:ln w="9525" cap="flat" cmpd="sng" algn="ctr">
+            <a:solidFill>
+              <a:schemeClr val="tx1"/>
+            </a:solidFill>
+            <a:prstDash val="solid"/>
+            <a:round/>
+            <a:headEnd type="none" w="med" len="med"/>
+            <a:tailEnd type="triangle"/>
+          </a:ln>
+          <a:effectLst/>
+        </p:spPr>
+      </p:cxnSp>
+      <p:sp>
+        <p:nvSpPr>
+          <p:cNvPr id="12" name="Textfeld 10">
+            <a:extLst>
+              <a:ext uri="{FF2B5EF4-FFF2-40B4-BE49-F238E27FC236}">
+                <a16:creationId xmlns:a16="http://schemas.microsoft.com/office/drawing/2014/main" id="{9803919A-D35D-6474-2286-6581CD2C024B}"/>
+              </a:ext>
+            </a:extLst>
+          </p:cNvPr>
+          <p:cNvSpPr txBox="1"/>
+          <p:nvPr/>
+        </p:nvSpPr>
+        <p:spPr>
+          <a:xfrm>
+            <a:off x="1259698" y="5098053"/>
+            <a:ext cx="2736000" cy="276999"/>
+          </a:xfrm>
+          <a:prstGeom prst="rect">
+            <a:avLst/>
+          </a:prstGeom>
+          <a:noFill/>
+          <a:ln>
+            <a:solidFill>
+              <a:schemeClr val="tx1"/>
+            </a:solidFill>
+          </a:ln>
+        </p:spPr>
+        <p:txBody>
+          <a:bodyPr wrap="square" rtlCol="0" anchor="ctr" anchorCtr="0">
+            <a:spAutoFit/>
+          </a:bodyPr>
+          <a:lstStyle/>
+          <a:p>
+            <a:r>
+              <a:rPr lang="en-US" sz="1200" dirty="0">
+                <a:latin typeface="Arial" panose="020B0604020202020204" pitchFamily="34" charset="0"/>
+                <a:cs typeface="Arial" panose="020B0604020202020204" pitchFamily="34" charset="0"/>
+              </a:rPr>
+              <a:t>Day 2 Lactate Missing (n=21,841)</a:t>
+            </a:r>
+          </a:p>
+        </p:txBody>
+      </p:sp>
+      <p:cxnSp>
+        <p:nvCxnSpPr>
+          <p:cNvPr id="13" name="Straight Arrow Connector 12">
+            <a:extLst>
+              <a:ext uri="{FF2B5EF4-FFF2-40B4-BE49-F238E27FC236}">
+                <a16:creationId xmlns:a16="http://schemas.microsoft.com/office/drawing/2014/main" id="{33A292FB-99CA-9674-D2DF-D5924A981FA7}"/>
+              </a:ext>
+            </a:extLst>
+          </p:cNvPr>
+          <p:cNvCxnSpPr>
+            <a:cxnSpLocks/>
+          </p:cNvCxnSpPr>
+          <p:nvPr/>
+        </p:nvCxnSpPr>
+        <p:spPr bwMode="auto">
+          <a:xfrm flipH="1">
+            <a:off x="3995698" y="5245050"/>
+            <a:ext cx="1262158" cy="1"/>
+          </a:xfrm>
+          <a:prstGeom prst="straightConnector1">
+            <a:avLst/>
+          </a:prstGeom>
+          <a:solidFill>
+            <a:schemeClr val="accent1"/>
+          </a:solidFill>
+          <a:ln w="9525" cap="flat" cmpd="sng" algn="ctr">
+            <a:solidFill>
+              <a:schemeClr val="tx1"/>
+            </a:solidFill>
+            <a:prstDash val="solid"/>
+            <a:round/>
+            <a:headEnd type="none" w="med" len="med"/>
+            <a:tailEnd type="triangle"/>
+          </a:ln>
+          <a:effectLst/>
+        </p:spPr>
+      </p:cxnSp>
+      <p:sp>
+        <p:nvSpPr>
+          <p:cNvPr id="14" name="Textfeld 10">
+            <a:extLst>
+              <a:ext uri="{FF2B5EF4-FFF2-40B4-BE49-F238E27FC236}">
+                <a16:creationId xmlns:a16="http://schemas.microsoft.com/office/drawing/2014/main" id="{ED961F9C-433E-FB36-30F2-3F620745563E}"/>
+              </a:ext>
+            </a:extLst>
+          </p:cNvPr>
+          <p:cNvSpPr txBox="1"/>
+          <p:nvPr/>
+        </p:nvSpPr>
+        <p:spPr>
+          <a:xfrm>
+            <a:off x="7003070" y="4368697"/>
+            <a:ext cx="2736000" cy="276999"/>
+          </a:xfrm>
+          <a:prstGeom prst="rect">
+            <a:avLst/>
+          </a:prstGeom>
+          <a:solidFill>
+            <a:schemeClr val="bg2">
+              <a:lumMod val="40000"/>
+              <a:lumOff val="60000"/>
+            </a:schemeClr>
+          </a:solidFill>
+          <a:ln>
+            <a:solidFill>
+              <a:schemeClr val="tx1"/>
+            </a:solidFill>
+          </a:ln>
+        </p:spPr>
+        <p:txBody>
+          <a:bodyPr wrap="square" rtlCol="0" anchor="ctr" anchorCtr="0">
+            <a:spAutoFit/>
+          </a:bodyPr>
+          <a:lstStyle/>
+          <a:p>
+            <a:r>
+              <a:rPr lang="en-US" sz="1200" dirty="0">
+                <a:latin typeface="Arial" panose="020B0604020202020204" pitchFamily="34" charset="0"/>
+                <a:cs typeface="Arial" panose="020B0604020202020204" pitchFamily="34" charset="0"/>
+              </a:rPr>
+              <a:t>Q1: Is Serum Lactate Racist?</a:t>
+            </a:r>
+          </a:p>
+        </p:txBody>
+      </p:sp>
+      <p:cxnSp>
+        <p:nvCxnSpPr>
+          <p:cNvPr id="16" name="Straight Arrow Connector 15">
+            <a:extLst>
+              <a:ext uri="{FF2B5EF4-FFF2-40B4-BE49-F238E27FC236}">
+                <a16:creationId xmlns:a16="http://schemas.microsoft.com/office/drawing/2014/main" id="{ECB7953F-D68A-439F-D8CD-D3A62EF6D192}"/>
+              </a:ext>
+            </a:extLst>
+          </p:cNvPr>
+          <p:cNvCxnSpPr>
+            <a:stCxn id="3" idx="3"/>
+            <a:endCxn id="14" idx="1"/>
+          </p:cNvCxnSpPr>
+          <p:nvPr/>
+        </p:nvCxnSpPr>
+        <p:spPr bwMode="auto">
+          <a:xfrm flipV="1">
+            <a:off x="6119504" y="4507197"/>
+            <a:ext cx="883566" cy="1"/>
+          </a:xfrm>
+          <a:prstGeom prst="straightConnector1">
+            <a:avLst/>
+          </a:prstGeom>
+          <a:solidFill>
+            <a:schemeClr val="accent1"/>
+          </a:solidFill>
+          <a:ln w="9525" cap="flat" cmpd="sng" algn="ctr">
+            <a:solidFill>
+              <a:schemeClr val="tx1"/>
+            </a:solidFill>
+            <a:prstDash val="solid"/>
+            <a:round/>
+            <a:headEnd type="none" w="med" len="med"/>
+            <a:tailEnd type="triangle"/>
+          </a:ln>
+          <a:effectLst/>
+        </p:spPr>
+      </p:cxnSp>
+      <p:sp>
+        <p:nvSpPr>
+          <p:cNvPr id="18" name="Textfeld 10">
+            <a:extLst>
+              <a:ext uri="{FF2B5EF4-FFF2-40B4-BE49-F238E27FC236}">
+                <a16:creationId xmlns:a16="http://schemas.microsoft.com/office/drawing/2014/main" id="{B37F5FE3-3A0B-E515-C54F-1588C8F19737}"/>
+              </a:ext>
+            </a:extLst>
+          </p:cNvPr>
+          <p:cNvSpPr txBox="1"/>
+          <p:nvPr/>
+        </p:nvSpPr>
+        <p:spPr>
+          <a:xfrm>
+            <a:off x="7003070" y="5888855"/>
+            <a:ext cx="2736000" cy="461665"/>
+          </a:xfrm>
+          <a:prstGeom prst="rect">
+            <a:avLst/>
+          </a:prstGeom>
+          <a:solidFill>
+            <a:schemeClr val="bg2">
+              <a:lumMod val="40000"/>
+              <a:lumOff val="60000"/>
+            </a:schemeClr>
+          </a:solidFill>
+          <a:ln>
+            <a:solidFill>
+              <a:schemeClr val="tx1"/>
+            </a:solidFill>
+          </a:ln>
+        </p:spPr>
+        <p:txBody>
+          <a:bodyPr wrap="square" rtlCol="0" anchor="ctr" anchorCtr="0">
+            <a:spAutoFit/>
+          </a:bodyPr>
+          <a:lstStyle/>
+          <a:p>
+            <a:r>
+              <a:rPr lang="en-US" sz="1200" dirty="0">
+                <a:latin typeface="Arial" panose="020B0604020202020204" pitchFamily="34" charset="0"/>
+                <a:cs typeface="Arial" panose="020B0604020202020204" pitchFamily="34" charset="0"/>
+              </a:rPr>
+              <a:t>Q2: If so, is it because cohorts of patients receive different treatments?</a:t>
+            </a:r>
+          </a:p>
+        </p:txBody>
+      </p:sp>
+      <p:cxnSp>
+        <p:nvCxnSpPr>
+          <p:cNvPr id="19" name="Straight Arrow Connector 18">
+            <a:extLst>
+              <a:ext uri="{FF2B5EF4-FFF2-40B4-BE49-F238E27FC236}">
+                <a16:creationId xmlns:a16="http://schemas.microsoft.com/office/drawing/2014/main" id="{3D045019-133A-68E3-26F9-A8B41D5D70D3}"/>
+              </a:ext>
+            </a:extLst>
+          </p:cNvPr>
+          <p:cNvCxnSpPr>
+            <a:endCxn id="18" idx="1"/>
+          </p:cNvCxnSpPr>
+          <p:nvPr/>
+        </p:nvCxnSpPr>
+        <p:spPr bwMode="auto">
+          <a:xfrm flipV="1">
+            <a:off x="6119504" y="6119688"/>
+            <a:ext cx="883566" cy="1"/>
+          </a:xfrm>
+          <a:prstGeom prst="straightConnector1">
+            <a:avLst/>
+          </a:prstGeom>
+          <a:solidFill>
+            <a:schemeClr val="accent1"/>
+          </a:solidFill>
+          <a:ln w="9525" cap="flat" cmpd="sng" algn="ctr">
+            <a:solidFill>
+              <a:schemeClr val="tx1"/>
+            </a:solidFill>
+            <a:prstDash val="solid"/>
+            <a:round/>
+            <a:headEnd type="none" w="med" len="med"/>
+            <a:tailEnd type="triangle"/>
+          </a:ln>
+          <a:effectLst/>
+        </p:spPr>
+      </p:cxnSp>
+    </p:spTree>
+    <p:extLst>
+      <p:ext uri="{BB962C8B-B14F-4D97-AF65-F5344CB8AC3E}">
+        <p14:creationId xmlns:p14="http://schemas.microsoft.com/office/powerpoint/2010/main" val="1756960470"/>
       </p:ext>
     </p:extLst>
   </p:cSld>
@@ -8497,6 +9672,12 @@
 </file>
 
 <file path=customXml/item1.xml><?xml version="1.0" encoding="utf-8"?>
+<p:properties xmlns:p="http://schemas.microsoft.com/office/2006/metadata/properties" xmlns:xsi="http://www.w3.org/2001/XMLSchema-instance" xmlns:pc="http://schemas.microsoft.com/office/infopath/2007/PartnerControls">
+  <documentManagement/>
+</p:properties>
+</file>
+
+<file path=customXml/item2.xml><?xml version="1.0" encoding="utf-8"?>
 <ct:contentTypeSchema xmlns:ct="http://schemas.microsoft.com/office/2006/metadata/contentType" xmlns:ma="http://schemas.microsoft.com/office/2006/metadata/properties/metaAttributes" ct:_="" ma:_="" ma:contentTypeName="Dokument" ma:contentTypeID="0x01010007E9DA9E47B96D4A9FF5869A522D2EBE" ma:contentTypeVersion="14" ma:contentTypeDescription="Ein neues Dokument erstellen." ma:contentTypeScope="" ma:versionID="c6b567c2eb3fec7b6e0779b66ade1c1d">
   <xsd:schema xmlns:xsd="http://www.w3.org/2001/XMLSchema" xmlns:xs="http://www.w3.org/2001/XMLSchema" xmlns:p="http://schemas.microsoft.com/office/2006/metadata/properties" xmlns:ns3="0c7ed570-c004-4df7-b924-f6f15cff9822" xmlns:ns4="fd3c8342-50e0-4f70-a5fe-1cf354f99926" targetNamespace="http://schemas.microsoft.com/office/2006/metadata/properties" ma:root="true" ma:fieldsID="cf608d3f30b78ea6f7b5008d854f34c9" ns3:_="" ns4:_="">
     <xsd:import namespace="0c7ed570-c004-4df7-b924-f6f15cff9822"/>
@@ -8725,12 +9906,6 @@
 </ct:contentTypeSchema>
 </file>
 
-<file path=customXml/item2.xml><?xml version="1.0" encoding="utf-8"?>
-<p:properties xmlns:p="http://schemas.microsoft.com/office/2006/metadata/properties" xmlns:xsi="http://www.w3.org/2001/XMLSchema-instance" xmlns:pc="http://schemas.microsoft.com/office/infopath/2007/PartnerControls">
-  <documentManagement/>
-</p:properties>
-</file>
-
 <file path=customXml/item3.xml><?xml version="1.0" encoding="utf-8"?>
 <?mso-contentType ?>
 <FormTemplates xmlns="http://schemas.microsoft.com/sharepoint/v3/contenttype/forms">
@@ -8741,6 +9916,23 @@
 </file>
 
 <file path=customXml/itemProps1.xml><?xml version="1.0" encoding="utf-8"?>
+<ds:datastoreItem xmlns:ds="http://schemas.openxmlformats.org/officeDocument/2006/customXml" ds:itemID="{1A94CC53-2CAC-471B-9BA4-2797B3DA82E3}">
+  <ds:schemaRefs>
+    <ds:schemaRef ds:uri="0c7ed570-c004-4df7-b924-f6f15cff9822"/>
+    <ds:schemaRef ds:uri="http://purl.org/dc/dcmitype/"/>
+    <ds:schemaRef ds:uri="http://purl.org/dc/elements/1.1/"/>
+    <ds:schemaRef ds:uri="http://schemas.microsoft.com/office/infopath/2007/PartnerControls"/>
+    <ds:schemaRef ds:uri="http://purl.org/dc/terms/"/>
+    <ds:schemaRef ds:uri="http://schemas.openxmlformats.org/package/2006/metadata/core-properties"/>
+    <ds:schemaRef ds:uri="http://schemas.microsoft.com/office/2006/documentManagement/types"/>
+    <ds:schemaRef ds:uri="fd3c8342-50e0-4f70-a5fe-1cf354f99926"/>
+    <ds:schemaRef ds:uri="http://schemas.microsoft.com/office/2006/metadata/properties"/>
+    <ds:schemaRef ds:uri="http://www.w3.org/XML/1998/namespace"/>
+  </ds:schemaRefs>
+</ds:datastoreItem>
+</file>
+
+<file path=customXml/itemProps2.xml><?xml version="1.0" encoding="utf-8"?>
 <ds:datastoreItem xmlns:ds="http://schemas.openxmlformats.org/officeDocument/2006/customXml" ds:itemID="{82D84E0E-EA78-4BD7-BB0A-CB2F5B4B4D89}">
   <ds:schemaRefs>
     <ds:schemaRef ds:uri="http://schemas.microsoft.com/office/2006/metadata/contentType"/>
@@ -8759,23 +9951,6 @@
 </ds:datastoreItem>
 </file>
 
-<file path=customXml/itemProps2.xml><?xml version="1.0" encoding="utf-8"?>
-<ds:datastoreItem xmlns:ds="http://schemas.openxmlformats.org/officeDocument/2006/customXml" ds:itemID="{1A94CC53-2CAC-471B-9BA4-2797B3DA82E3}">
-  <ds:schemaRefs>
-    <ds:schemaRef ds:uri="0c7ed570-c004-4df7-b924-f6f15cff9822"/>
-    <ds:schemaRef ds:uri="http://purl.org/dc/dcmitype/"/>
-    <ds:schemaRef ds:uri="http://purl.org/dc/elements/1.1/"/>
-    <ds:schemaRef ds:uri="http://schemas.microsoft.com/office/infopath/2007/PartnerControls"/>
-    <ds:schemaRef ds:uri="http://purl.org/dc/terms/"/>
-    <ds:schemaRef ds:uri="http://schemas.openxmlformats.org/package/2006/metadata/core-properties"/>
-    <ds:schemaRef ds:uri="http://schemas.microsoft.com/office/2006/documentManagement/types"/>
-    <ds:schemaRef ds:uri="fd3c8342-50e0-4f70-a5fe-1cf354f99926"/>
-    <ds:schemaRef ds:uri="http://schemas.microsoft.com/office/2006/metadata/properties"/>
-    <ds:schemaRef ds:uri="http://www.w3.org/XML/1998/namespace"/>
-  </ds:schemaRefs>
-</ds:datastoreItem>
-</file>
-
 <file path=customXml/itemProps3.xml><?xml version="1.0" encoding="utf-8"?>
 <ds:datastoreItem xmlns:ds="http://schemas.openxmlformats.org/officeDocument/2006/customXml" ds:itemID="{9FA18103-7F7B-4DF6-B5E4-0AF29ECCC122}">
   <ds:schemaRefs>

</xml_diff>